<commit_message>
Added link to R script for tutorial
</commit_message>
<xml_diff>
--- a/seminars/teaching/r_ggplot2_intermediate_23052018/ggplot2_coverslides_23052018.pptx
+++ b/seminars/teaching/r_ggplot2_intermediate_23052018/ggplot2_coverslides_23052018.pptx
@@ -6442,6 +6442,13 @@
   <p:clrMapOvr>
     <a:masterClrMapping/>
   </p:clrMapOvr>
+  <p:timing>
+    <p:tnLst>
+      <p:par>
+        <p:cTn xmlns:p14="http://schemas.microsoft.com/office/powerpoint/2010/main" id="1" dur="indefinite" restart="never" nodeType="tmRoot"/>
+      </p:par>
+    </p:tnLst>
+  </p:timing>
 </p:sld>
 </file>
 
@@ -7405,10 +7412,6 @@
               </a:rPr>
               <a:t> = "top") </a:t>
             </a:r>
-            <a:endParaRPr lang="en-US" b="1" dirty="0">
-              <a:latin typeface="Times New Roman"/>
-              <a:cs typeface="Times New Roman"/>
-            </a:endParaRPr>
           </a:p>
         </p:txBody>
       </p:sp>
@@ -7724,7 +7727,7 @@
         <p:spPr/>
         <p:txBody>
           <a:bodyPr>
-            <a:normAutofit/>
+            <a:normAutofit lnSpcReduction="10000"/>
           </a:bodyPr>
           <a:lstStyle/>
           <a:p>
@@ -7737,23 +7740,22 @@
             <a:pPr lvl="1"/>
             <a:r>
               <a:rPr lang="en-US" dirty="0" smtClean="0"/>
-              <a:t>You </a:t>
-            </a:r>
+              <a:t>You have used ggplot2 before</a:t>
+            </a:r>
+          </a:p>
+          <a:p>
+            <a:pPr lvl="1"/>
             <a:r>
               <a:rPr lang="en-US" dirty="0" smtClean="0"/>
-              <a:t>have used ggplot2 before</a:t>
-            </a:r>
-            <a:endParaRPr lang="en-US" dirty="0" smtClean="0"/>
-          </a:p>
-          <a:p>
-            <a:pPr lvl="1"/>
+              <a:t>You want to learn </a:t>
+            </a:r>
             <a:r>
               <a:rPr lang="en-US" dirty="0" smtClean="0"/>
-              <a:t>You want to </a:t>
+              <a:t>about stylizing your plots, and </a:t>
             </a:r>
             <a:r>
               <a:rPr lang="en-US" dirty="0" smtClean="0"/>
-              <a:t>learn about plotting multiple variables in </a:t>
+              <a:t>plotting multiple variables in </a:t>
             </a:r>
             <a:r>
               <a:rPr lang="en-US" dirty="0" err="1" smtClean="0"/>
@@ -7783,16 +7785,17 @@
             <a:pPr lvl="1"/>
             <a:r>
               <a:rPr lang="en-US" dirty="0" smtClean="0"/>
-              <a:t>You are already an </a:t>
+              <a:t>You are already an advanced </a:t>
             </a:r>
             <a:r>
               <a:rPr lang="en-US" dirty="0" smtClean="0"/>
-              <a:t>advanced ggplot2 </a:t>
+              <a:t>R </a:t>
             </a:r>
             <a:r>
               <a:rPr lang="en-US" dirty="0" smtClean="0"/>
               <a:t>user </a:t>
             </a:r>
+            <a:endParaRPr lang="en-US" dirty="0" smtClean="0"/>
           </a:p>
           <a:p>
             <a:pPr lvl="1"/>
@@ -7804,10 +7807,32 @@
               <a:rPr lang="en-US" dirty="0" err="1" smtClean="0"/>
               <a:t>ggplot</a:t>
             </a:r>
+            <a:endParaRPr lang="en-US" dirty="0" smtClean="0"/>
+          </a:p>
+          <a:p>
             <a:r>
               <a:rPr lang="en-US" dirty="0" smtClean="0"/>
-              <a:t>. </a:t>
-            </a:r>
+              <a:t>Maybe, if</a:t>
+            </a:r>
+            <a:endParaRPr lang="en-US" dirty="0" smtClean="0"/>
+          </a:p>
+          <a:p>
+            <a:pPr lvl="1"/>
+            <a:r>
+              <a:rPr lang="en-US" dirty="0" smtClean="0"/>
+              <a:t>You have never used </a:t>
+            </a:r>
+            <a:r>
+              <a:rPr lang="en-US" dirty="0" err="1" smtClean="0"/>
+              <a:t>Rstudio</a:t>
+            </a:r>
+            <a:r>
+              <a:rPr lang="en-US" dirty="0" smtClean="0"/>
+              <a:t> or ggplot2 before</a:t>
+            </a:r>
+          </a:p>
+          <a:p>
+            <a:pPr lvl="1"/>
             <a:endParaRPr lang="en-US" dirty="0"/>
           </a:p>
         </p:txBody>
@@ -7891,6 +7916,13 @@
   <p:clrMapOvr>
     <a:masterClrMapping/>
   </p:clrMapOvr>
+  <p:timing>
+    <p:tnLst>
+      <p:par>
+        <p:cTn xmlns:p14="http://schemas.microsoft.com/office/powerpoint/2010/main" id="1" dur="indefinite" restart="never" nodeType="tmRoot"/>
+      </p:par>
+    </p:tnLst>
+  </p:timing>
 </p:sld>
 </file>
 
@@ -7951,21 +7983,13 @@
           <a:p>
             <a:r>
               <a:rPr lang="en-US" dirty="0" smtClean="0"/>
-              <a:t>The </a:t>
-            </a:r>
+              <a:t>The grammar of ggplot2</a:t>
+            </a:r>
+          </a:p>
+          <a:p>
             <a:r>
               <a:rPr lang="en-US" dirty="0" smtClean="0"/>
-              <a:t>grammar of ggplot2</a:t>
-            </a:r>
-          </a:p>
-          <a:p>
-            <a:r>
-              <a:rPr lang="en-US" dirty="0" smtClean="0"/>
-              <a:t>The </a:t>
-            </a:r>
-            <a:r>
-              <a:rPr lang="en-US" dirty="0" smtClean="0"/>
-              <a:t>different components of a </a:t>
+              <a:t>The different components of a </a:t>
             </a:r>
             <a:r>
               <a:rPr lang="en-US" dirty="0" err="1" smtClean="0"/>
@@ -7975,16 +7999,15 @@
               <a:rPr lang="en-US" dirty="0" smtClean="0"/>
               <a:t> </a:t>
             </a:r>
-            <a:endParaRPr lang="en-US" dirty="0" smtClean="0"/>
-          </a:p>
-          <a:p>
+          </a:p>
+          <a:p>
+            <a:r>
+              <a:rPr lang="en-US" smtClean="0"/>
+              <a:t>Making </a:t>
+            </a:r>
             <a:r>
               <a:rPr lang="en-US" dirty="0" smtClean="0"/>
-              <a:t>Be able to make scatterplots, histograms, boxplots, and density distributions </a:t>
-            </a:r>
-            <a:r>
-              <a:rPr lang="en-US" dirty="0" smtClean="0"/>
-              <a:t>with </a:t>
+              <a:t>scatterplots, histograms, boxplots, and density distributions with </a:t>
             </a:r>
             <a:r>
               <a:rPr lang="en-US" dirty="0" err="1" smtClean="0"/>
@@ -8076,6 +8099,13 @@
   <p:clrMapOvr>
     <a:masterClrMapping/>
   </p:clrMapOvr>
+  <p:timing>
+    <p:tnLst>
+      <p:par>
+        <p:cTn xmlns:p14="http://schemas.microsoft.com/office/powerpoint/2010/main" id="1" dur="indefinite" restart="never" nodeType="tmRoot"/>
+      </p:par>
+    </p:tnLst>
+  </p:timing>
 </p:sld>
 </file>
 
@@ -8276,6 +8306,13 @@
   <p:clrMapOvr>
     <a:masterClrMapping/>
   </p:clrMapOvr>
+  <p:timing>
+    <p:tnLst>
+      <p:par>
+        <p:cTn xmlns:p14="http://schemas.microsoft.com/office/powerpoint/2010/main" id="1" dur="indefinite" restart="never" nodeType="tmRoot"/>
+      </p:par>
+    </p:tnLst>
+  </p:timing>
 </p:sld>
 </file>
 
@@ -9372,10 +9409,6 @@
               </a:rPr>
               <a:t>("Does being in a metro area influence poverty?")</a:t>
             </a:r>
-            <a:endParaRPr lang="en-US" b="1" dirty="0">
-              <a:latin typeface="Times New Roman"/>
-              <a:cs typeface="Times New Roman"/>
-            </a:endParaRPr>
           </a:p>
         </p:txBody>
       </p:sp>

</xml_diff>